<commit_message>
add more help in case1 init
</commit_message>
<xml_diff>
--- a/lessons/B_GPT_Robjects/B_Robjects.pptx
+++ b/lessons/B_GPT_Robjects/B_Robjects.pptx
@@ -5,7 +5,7 @@
     <p:sldMasterId id="2147483672" r:id="rId1"/>
   </p:sldMasterIdLst>
   <p:notesMasterIdLst>
-    <p:notesMasterId r:id="rId18"/>
+    <p:notesMasterId r:id="rId17"/>
   </p:notesMasterIdLst>
   <p:sldIdLst>
     <p:sldId id="622" r:id="rId2"/>
@@ -23,7 +23,6 @@
     <p:sldId id="660" r:id="rId14"/>
     <p:sldId id="363" r:id="rId15"/>
     <p:sldId id="659" r:id="rId16"/>
-    <p:sldId id="379" r:id="rId17"/>
   </p:sldIdLst>
   <p:sldSz cx="9144000" cy="6858000" type="screen4x3"/>
   <p:notesSz cx="7010400" cy="9296400"/>
@@ -212,7 +211,7 @@
           <a:p>
             <a:fld id="{C333ABA6-B72D-4ED4-A6E7-13A0DAE65F1A}" type="datetimeFigureOut">
               <a:rPr lang="en-US" smtClean="0"/>
-              <a:t>5/7/23</a:t>
+              <a:t>5/23/23</a:t>
             </a:fld>
             <a:endParaRPr lang="en-US"/>
           </a:p>
@@ -594,90 +593,6 @@
 </p:notes>
 </file>
 
-<file path=ppt/notesSlides/notesSlide2.xml><?xml version="1.0" encoding="utf-8"?>
-<p:notes xmlns:a="http://schemas.openxmlformats.org/drawingml/2006/main" xmlns:r="http://schemas.openxmlformats.org/officeDocument/2006/relationships" xmlns:p="http://schemas.openxmlformats.org/presentationml/2006/main">
-  <p:cSld>
-    <p:spTree>
-      <p:nvGrpSpPr>
-        <p:cNvPr id="1" name=""/>
-        <p:cNvGrpSpPr/>
-        <p:nvPr/>
-      </p:nvGrpSpPr>
-      <p:grpSpPr>
-        <a:xfrm>
-          <a:off x="0" y="0"/>
-          <a:ext cx="0" cy="0"/>
-          <a:chOff x="0" y="0"/>
-          <a:chExt cx="0" cy="0"/>
-        </a:xfrm>
-      </p:grpSpPr>
-      <p:sp>
-        <p:nvSpPr>
-          <p:cNvPr id="2" name="Slide Image Placeholder 1"/>
-          <p:cNvSpPr>
-            <a:spLocks noGrp="1" noRot="1" noChangeAspect="1"/>
-          </p:cNvSpPr>
-          <p:nvPr>
-            <p:ph type="sldImg"/>
-          </p:nvPr>
-        </p:nvSpPr>
-        <p:spPr/>
-      </p:sp>
-      <p:sp>
-        <p:nvSpPr>
-          <p:cNvPr id="3" name="Notes Placeholder 2"/>
-          <p:cNvSpPr>
-            <a:spLocks noGrp="1"/>
-          </p:cNvSpPr>
-          <p:nvPr>
-            <p:ph type="body" idx="1"/>
-          </p:nvPr>
-        </p:nvSpPr>
-        <p:spPr/>
-        <p:txBody>
-          <a:bodyPr/>
-          <a:lstStyle/>
-          <a:p>
-            <a:endParaRPr lang="en-US" dirty="0"/>
-          </a:p>
-        </p:txBody>
-      </p:sp>
-      <p:sp>
-        <p:nvSpPr>
-          <p:cNvPr id="4" name="Slide Number Placeholder 3"/>
-          <p:cNvSpPr>
-            <a:spLocks noGrp="1"/>
-          </p:cNvSpPr>
-          <p:nvPr>
-            <p:ph type="sldNum" sz="quarter" idx="5"/>
-          </p:nvPr>
-        </p:nvSpPr>
-        <p:spPr/>
-        <p:txBody>
-          <a:bodyPr/>
-          <a:lstStyle/>
-          <a:p>
-            <a:fld id="{ADC303B9-2C3E-4EA0-A819-58B20A5A846C}" type="slidenum">
-              <a:rPr lang="en-US" smtClean="0"/>
-              <a:t>16</a:t>
-            </a:fld>
-            <a:endParaRPr lang="en-US"/>
-          </a:p>
-        </p:txBody>
-      </p:sp>
-    </p:spTree>
-    <p:extLst>
-      <p:ext uri="{BB962C8B-B14F-4D97-AF65-F5344CB8AC3E}">
-        <p14:creationId xmlns:p14="http://schemas.microsoft.com/office/powerpoint/2010/main" val="2244329818"/>
-      </p:ext>
-    </p:extLst>
-  </p:cSld>
-  <p:clrMapOvr>
-    <a:masterClrMapping/>
-  </p:clrMapOvr>
-</p:notes>
-</file>
-
 <file path=ppt/slideLayouts/slideLayout1.xml><?xml version="1.0" encoding="utf-8"?>
 <p:sldLayout xmlns:a="http://schemas.openxmlformats.org/drawingml/2006/main" xmlns:r="http://schemas.openxmlformats.org/officeDocument/2006/relationships" xmlns:p="http://schemas.openxmlformats.org/presentationml/2006/main" type="title" preserve="1">
   <p:cSld name="Title Slide">
@@ -810,7 +725,7 @@
           <a:p>
             <a:fld id="{5738B90E-0779-4C36-915C-6F05FCD89456}" type="datetime1">
               <a:rPr lang="en-US" smtClean="0"/>
-              <a:t>5/7/23</a:t>
+              <a:t>5/23/23</a:t>
             </a:fld>
             <a:endParaRPr lang="en-US"/>
           </a:p>
@@ -844,47 +759,6 @@
           </a:p>
         </p:txBody>
       </p:sp>
-      <p:pic>
-        <p:nvPicPr>
-          <p:cNvPr id="12290" name="Picture 2" descr="Image result for harvard logo transparent"/>
-          <p:cNvPicPr>
-            <a:picLocks noChangeAspect="1" noChangeArrowheads="1"/>
-          </p:cNvPicPr>
-          <p:nvPr userDrawn="1"/>
-        </p:nvPicPr>
-        <p:blipFill>
-          <a:blip r:embed="rId2" cstate="print">
-            <a:extLst>
-              <a:ext uri="{28A0092B-C50C-407E-A947-70E740481C1C}">
-                <a14:useLocalDpi xmlns:a14="http://schemas.microsoft.com/office/drawing/2010/main" val="0"/>
-              </a:ext>
-            </a:extLst>
-          </a:blip>
-          <a:srcRect/>
-          <a:stretch>
-            <a:fillRect/>
-          </a:stretch>
-        </p:blipFill>
-        <p:spPr bwMode="auto">
-          <a:xfrm>
-            <a:off x="7315200" y="6248400"/>
-            <a:ext cx="1828800" cy="609600"/>
-          </a:xfrm>
-          <a:prstGeom prst="rect">
-            <a:avLst/>
-          </a:prstGeom>
-          <a:noFill/>
-          <a:extLst>
-            <a:ext uri="{909E8E84-426E-40DD-AFC4-6F175D3DCCD1}">
-              <a14:hiddenFill xmlns:a14="http://schemas.microsoft.com/office/drawing/2010/main">
-                <a:solidFill>
-                  <a:srgbClr val="FFFFFF"/>
-                </a:solidFill>
-              </a14:hiddenFill>
-            </a:ext>
-          </a:extLst>
-        </p:spPr>
-      </p:pic>
       <p:sp>
         <p:nvSpPr>
           <p:cNvPr id="8" name="Footer Placeholder 4"/>
@@ -1028,7 +902,7 @@
           <a:p>
             <a:fld id="{7B9EA29D-D431-42FE-B7B6-AAE4454C77D3}" type="datetime1">
               <a:rPr lang="en-US" smtClean="0"/>
-              <a:t>5/7/23</a:t>
+              <a:t>5/23/23</a:t>
             </a:fld>
             <a:endParaRPr lang="en-US"/>
           </a:p>
@@ -1114,47 +988,6 @@
           </a:p>
         </p:txBody>
       </p:sp>
-      <p:pic>
-        <p:nvPicPr>
-          <p:cNvPr id="9" name="Picture 2" descr="Image result for harvard logo transparent"/>
-          <p:cNvPicPr>
-            <a:picLocks noChangeAspect="1" noChangeArrowheads="1"/>
-          </p:cNvPicPr>
-          <p:nvPr userDrawn="1"/>
-        </p:nvPicPr>
-        <p:blipFill>
-          <a:blip r:embed="rId2" cstate="print">
-            <a:extLst>
-              <a:ext uri="{28A0092B-C50C-407E-A947-70E740481C1C}">
-                <a14:useLocalDpi xmlns:a14="http://schemas.microsoft.com/office/drawing/2010/main" val="0"/>
-              </a:ext>
-            </a:extLst>
-          </a:blip>
-          <a:srcRect/>
-          <a:stretch>
-            <a:fillRect/>
-          </a:stretch>
-        </p:blipFill>
-        <p:spPr bwMode="auto">
-          <a:xfrm>
-            <a:off x="7315200" y="6248400"/>
-            <a:ext cx="1828800" cy="609600"/>
-          </a:xfrm>
-          <a:prstGeom prst="rect">
-            <a:avLst/>
-          </a:prstGeom>
-          <a:noFill/>
-          <a:extLst>
-            <a:ext uri="{909E8E84-426E-40DD-AFC4-6F175D3DCCD1}">
-              <a14:hiddenFill xmlns:a14="http://schemas.microsoft.com/office/drawing/2010/main">
-                <a:solidFill>
-                  <a:srgbClr val="FFFFFF"/>
-                </a:solidFill>
-              </a14:hiddenFill>
-            </a:ext>
-          </a:extLst>
-        </p:spPr>
-      </p:pic>
     </p:spTree>
     <p:extLst>
       <p:ext uri="{BB962C8B-B14F-4D97-AF65-F5344CB8AC3E}">
@@ -1288,7 +1121,7 @@
           <a:p>
             <a:fld id="{690D8A1E-EA8F-46C1-B891-AE0C00D9C314}" type="datetime1">
               <a:rPr lang="en-US" smtClean="0"/>
-              <a:t>5/7/23</a:t>
+              <a:t>5/23/23</a:t>
             </a:fld>
             <a:endParaRPr lang="en-US"/>
           </a:p>
@@ -1322,47 +1155,6 @@
           </a:p>
         </p:txBody>
       </p:sp>
-      <p:pic>
-        <p:nvPicPr>
-          <p:cNvPr id="8" name="Picture 2" descr="Image result for harvard logo transparent"/>
-          <p:cNvPicPr>
-            <a:picLocks noChangeAspect="1" noChangeArrowheads="1"/>
-          </p:cNvPicPr>
-          <p:nvPr userDrawn="1"/>
-        </p:nvPicPr>
-        <p:blipFill>
-          <a:blip r:embed="rId2" cstate="print">
-            <a:extLst>
-              <a:ext uri="{28A0092B-C50C-407E-A947-70E740481C1C}">
-                <a14:useLocalDpi xmlns:a14="http://schemas.microsoft.com/office/drawing/2010/main" val="0"/>
-              </a:ext>
-            </a:extLst>
-          </a:blip>
-          <a:srcRect/>
-          <a:stretch>
-            <a:fillRect/>
-          </a:stretch>
-        </p:blipFill>
-        <p:spPr bwMode="auto">
-          <a:xfrm>
-            <a:off x="7315200" y="6248400"/>
-            <a:ext cx="1828800" cy="609600"/>
-          </a:xfrm>
-          <a:prstGeom prst="rect">
-            <a:avLst/>
-          </a:prstGeom>
-          <a:noFill/>
-          <a:extLst>
-            <a:ext uri="{909E8E84-426E-40DD-AFC4-6F175D3DCCD1}">
-              <a14:hiddenFill xmlns:a14="http://schemas.microsoft.com/office/drawing/2010/main">
-                <a:solidFill>
-                  <a:srgbClr val="FFFFFF"/>
-                </a:solidFill>
-              </a14:hiddenFill>
-            </a:ext>
-          </a:extLst>
-        </p:spPr>
-      </p:pic>
       <p:sp>
         <p:nvSpPr>
           <p:cNvPr id="9" name="Title 1"/>
@@ -1582,7 +1374,7 @@
           <a:p>
             <a:fld id="{D753EFC8-4232-4598-94F6-94C0EBAFC469}" type="datetime1">
               <a:rPr lang="en-US" smtClean="0"/>
-              <a:t>5/7/23</a:t>
+              <a:t>5/23/23</a:t>
             </a:fld>
             <a:endParaRPr lang="en-US"/>
           </a:p>
@@ -1616,47 +1408,6 @@
           </a:p>
         </p:txBody>
       </p:sp>
-      <p:pic>
-        <p:nvPicPr>
-          <p:cNvPr id="8" name="Picture 2" descr="Image result for harvard logo transparent"/>
-          <p:cNvPicPr>
-            <a:picLocks noChangeAspect="1" noChangeArrowheads="1"/>
-          </p:cNvPicPr>
-          <p:nvPr userDrawn="1"/>
-        </p:nvPicPr>
-        <p:blipFill>
-          <a:blip r:embed="rId2" cstate="print">
-            <a:extLst>
-              <a:ext uri="{28A0092B-C50C-407E-A947-70E740481C1C}">
-                <a14:useLocalDpi xmlns:a14="http://schemas.microsoft.com/office/drawing/2010/main" val="0"/>
-              </a:ext>
-            </a:extLst>
-          </a:blip>
-          <a:srcRect/>
-          <a:stretch>
-            <a:fillRect/>
-          </a:stretch>
-        </p:blipFill>
-        <p:spPr bwMode="auto">
-          <a:xfrm>
-            <a:off x="7315200" y="6248400"/>
-            <a:ext cx="1828800" cy="609600"/>
-          </a:xfrm>
-          <a:prstGeom prst="rect">
-            <a:avLst/>
-          </a:prstGeom>
-          <a:noFill/>
-          <a:extLst>
-            <a:ext uri="{909E8E84-426E-40DD-AFC4-6F175D3DCCD1}">
-              <a14:hiddenFill xmlns:a14="http://schemas.microsoft.com/office/drawing/2010/main">
-                <a:solidFill>
-                  <a:srgbClr val="FFFFFF"/>
-                </a:solidFill>
-              </a14:hiddenFill>
-            </a:ext>
-          </a:extLst>
-        </p:spPr>
-      </p:pic>
       <p:sp>
         <p:nvSpPr>
           <p:cNvPr id="9" name="Footer Placeholder 4"/>
@@ -1897,7 +1648,7 @@
           <a:p>
             <a:fld id="{F3161074-1C18-4AE7-957D-F18524378C85}" type="datetime1">
               <a:rPr lang="en-US" smtClean="0"/>
-              <a:t>5/7/23</a:t>
+              <a:t>5/23/23</a:t>
             </a:fld>
             <a:endParaRPr lang="en-US"/>
           </a:p>
@@ -1931,47 +1682,6 @@
           </a:p>
         </p:txBody>
       </p:sp>
-      <p:pic>
-        <p:nvPicPr>
-          <p:cNvPr id="8" name="Picture 2" descr="Image result for harvard logo transparent"/>
-          <p:cNvPicPr>
-            <a:picLocks noChangeAspect="1" noChangeArrowheads="1"/>
-          </p:cNvPicPr>
-          <p:nvPr userDrawn="1"/>
-        </p:nvPicPr>
-        <p:blipFill>
-          <a:blip r:embed="rId2" cstate="print">
-            <a:extLst>
-              <a:ext uri="{28A0092B-C50C-407E-A947-70E740481C1C}">
-                <a14:useLocalDpi xmlns:a14="http://schemas.microsoft.com/office/drawing/2010/main" val="0"/>
-              </a:ext>
-            </a:extLst>
-          </a:blip>
-          <a:srcRect/>
-          <a:stretch>
-            <a:fillRect/>
-          </a:stretch>
-        </p:blipFill>
-        <p:spPr bwMode="auto">
-          <a:xfrm>
-            <a:off x="7315200" y="6248400"/>
-            <a:ext cx="1828800" cy="609600"/>
-          </a:xfrm>
-          <a:prstGeom prst="rect">
-            <a:avLst/>
-          </a:prstGeom>
-          <a:noFill/>
-          <a:extLst>
-            <a:ext uri="{909E8E84-426E-40DD-AFC4-6F175D3DCCD1}">
-              <a14:hiddenFill xmlns:a14="http://schemas.microsoft.com/office/drawing/2010/main">
-                <a:solidFill>
-                  <a:srgbClr val="FFFFFF"/>
-                </a:solidFill>
-              </a14:hiddenFill>
-            </a:ext>
-          </a:extLst>
-        </p:spPr>
-      </p:pic>
       <p:sp>
         <p:nvSpPr>
           <p:cNvPr id="9" name="Footer Placeholder 4"/>
@@ -2171,7 +1881,7 @@
           <a:p>
             <a:fld id="{69BE256C-8D9A-4404-B47D-41A1AE514425}" type="datetime1">
               <a:rPr lang="en-US" smtClean="0"/>
-              <a:t>5/7/23</a:t>
+              <a:t>5/23/23</a:t>
             </a:fld>
             <a:endParaRPr lang="en-US"/>
           </a:p>
@@ -2235,47 +1945,6 @@
           </a:p>
         </p:txBody>
       </p:sp>
-      <p:pic>
-        <p:nvPicPr>
-          <p:cNvPr id="10" name="Picture 2" descr="Image result for harvard logo transparent"/>
-          <p:cNvPicPr>
-            <a:picLocks noChangeAspect="1" noChangeArrowheads="1"/>
-          </p:cNvPicPr>
-          <p:nvPr userDrawn="1"/>
-        </p:nvPicPr>
-        <p:blipFill>
-          <a:blip r:embed="rId2" cstate="print">
-            <a:extLst>
-              <a:ext uri="{28A0092B-C50C-407E-A947-70E740481C1C}">
-                <a14:useLocalDpi xmlns:a14="http://schemas.microsoft.com/office/drawing/2010/main" val="0"/>
-              </a:ext>
-            </a:extLst>
-          </a:blip>
-          <a:srcRect/>
-          <a:stretch>
-            <a:fillRect/>
-          </a:stretch>
-        </p:blipFill>
-        <p:spPr bwMode="auto">
-          <a:xfrm>
-            <a:off x="7315200" y="6248400"/>
-            <a:ext cx="1828800" cy="609600"/>
-          </a:xfrm>
-          <a:prstGeom prst="rect">
-            <a:avLst/>
-          </a:prstGeom>
-          <a:noFill/>
-          <a:extLst>
-            <a:ext uri="{909E8E84-426E-40DD-AFC4-6F175D3DCCD1}">
-              <a14:hiddenFill xmlns:a14="http://schemas.microsoft.com/office/drawing/2010/main">
-                <a:solidFill>
-                  <a:srgbClr val="FFFFFF"/>
-                </a:solidFill>
-              </a14:hiddenFill>
-            </a:ext>
-          </a:extLst>
-        </p:spPr>
-      </p:pic>
       <p:sp>
         <p:nvSpPr>
           <p:cNvPr id="11" name="Footer Placeholder 4"/>
@@ -2605,7 +2274,7 @@
           <a:p>
             <a:fld id="{66CB2154-9035-4012-8189-BAAB61C5A5EE}" type="datetime1">
               <a:rPr lang="en-US" smtClean="0"/>
-              <a:t>5/7/23</a:t>
+              <a:t>5/23/23</a:t>
             </a:fld>
             <a:endParaRPr lang="en-US"/>
           </a:p>
@@ -2691,47 +2360,6 @@
           </a:p>
         </p:txBody>
       </p:sp>
-      <p:pic>
-        <p:nvPicPr>
-          <p:cNvPr id="12" name="Picture 2" descr="Image result for harvard logo transparent"/>
-          <p:cNvPicPr>
-            <a:picLocks noChangeAspect="1" noChangeArrowheads="1"/>
-          </p:cNvPicPr>
-          <p:nvPr userDrawn="1"/>
-        </p:nvPicPr>
-        <p:blipFill>
-          <a:blip r:embed="rId2" cstate="print">
-            <a:extLst>
-              <a:ext uri="{28A0092B-C50C-407E-A947-70E740481C1C}">
-                <a14:useLocalDpi xmlns:a14="http://schemas.microsoft.com/office/drawing/2010/main" val="0"/>
-              </a:ext>
-            </a:extLst>
-          </a:blip>
-          <a:srcRect/>
-          <a:stretch>
-            <a:fillRect/>
-          </a:stretch>
-        </p:blipFill>
-        <p:spPr bwMode="auto">
-          <a:xfrm>
-            <a:off x="7315200" y="6248400"/>
-            <a:ext cx="1828800" cy="609600"/>
-          </a:xfrm>
-          <a:prstGeom prst="rect">
-            <a:avLst/>
-          </a:prstGeom>
-          <a:noFill/>
-          <a:extLst>
-            <a:ext uri="{909E8E84-426E-40DD-AFC4-6F175D3DCCD1}">
-              <a14:hiddenFill xmlns:a14="http://schemas.microsoft.com/office/drawing/2010/main">
-                <a:solidFill>
-                  <a:srgbClr val="FFFFFF"/>
-                </a:solidFill>
-              </a14:hiddenFill>
-            </a:ext>
-          </a:extLst>
-        </p:spPr>
-      </p:pic>
     </p:spTree>
     <p:extLst>
       <p:ext uri="{BB962C8B-B14F-4D97-AF65-F5344CB8AC3E}">
@@ -2779,7 +2407,7 @@
           <a:p>
             <a:fld id="{6700A58B-DD98-43D0-B791-721480A02982}" type="datetime1">
               <a:rPr lang="en-US" smtClean="0"/>
-              <a:t>5/7/23</a:t>
+              <a:t>5/23/23</a:t>
             </a:fld>
             <a:endParaRPr lang="en-US"/>
           </a:p>
@@ -2843,47 +2471,6 @@
           </a:p>
         </p:txBody>
       </p:sp>
-      <p:pic>
-        <p:nvPicPr>
-          <p:cNvPr id="8" name="Picture 2" descr="Image result for harvard logo transparent"/>
-          <p:cNvPicPr>
-            <a:picLocks noChangeAspect="1" noChangeArrowheads="1"/>
-          </p:cNvPicPr>
-          <p:nvPr userDrawn="1"/>
-        </p:nvPicPr>
-        <p:blipFill>
-          <a:blip r:embed="rId2" cstate="print">
-            <a:extLst>
-              <a:ext uri="{28A0092B-C50C-407E-A947-70E740481C1C}">
-                <a14:useLocalDpi xmlns:a14="http://schemas.microsoft.com/office/drawing/2010/main" val="0"/>
-              </a:ext>
-            </a:extLst>
-          </a:blip>
-          <a:srcRect/>
-          <a:stretch>
-            <a:fillRect/>
-          </a:stretch>
-        </p:blipFill>
-        <p:spPr bwMode="auto">
-          <a:xfrm>
-            <a:off x="7315200" y="6248400"/>
-            <a:ext cx="1828800" cy="609600"/>
-          </a:xfrm>
-          <a:prstGeom prst="rect">
-            <a:avLst/>
-          </a:prstGeom>
-          <a:noFill/>
-          <a:extLst>
-            <a:ext uri="{909E8E84-426E-40DD-AFC4-6F175D3DCCD1}">
-              <a14:hiddenFill xmlns:a14="http://schemas.microsoft.com/office/drawing/2010/main">
-                <a:solidFill>
-                  <a:srgbClr val="FFFFFF"/>
-                </a:solidFill>
-              </a14:hiddenFill>
-            </a:ext>
-          </a:extLst>
-        </p:spPr>
-      </p:pic>
       <p:sp>
         <p:nvSpPr>
           <p:cNvPr id="9" name="Footer Placeholder 4"/>
@@ -2971,7 +2558,7 @@
           <a:p>
             <a:fld id="{7DB6E382-4F61-4E24-BE1A-377EC83D0E3A}" type="datetime1">
               <a:rPr lang="en-US" smtClean="0"/>
-              <a:t>5/7/23</a:t>
+              <a:t>5/23/23</a:t>
             </a:fld>
             <a:endParaRPr lang="en-US"/>
           </a:p>
@@ -3005,47 +2592,6 @@
           </a:p>
         </p:txBody>
       </p:sp>
-      <p:pic>
-        <p:nvPicPr>
-          <p:cNvPr id="6" name="Picture 2" descr="Image result for harvard logo transparent"/>
-          <p:cNvPicPr>
-            <a:picLocks noChangeAspect="1" noChangeArrowheads="1"/>
-          </p:cNvPicPr>
-          <p:nvPr userDrawn="1"/>
-        </p:nvPicPr>
-        <p:blipFill>
-          <a:blip r:embed="rId2" cstate="print">
-            <a:extLst>
-              <a:ext uri="{28A0092B-C50C-407E-A947-70E740481C1C}">
-                <a14:useLocalDpi xmlns:a14="http://schemas.microsoft.com/office/drawing/2010/main" val="0"/>
-              </a:ext>
-            </a:extLst>
-          </a:blip>
-          <a:srcRect/>
-          <a:stretch>
-            <a:fillRect/>
-          </a:stretch>
-        </p:blipFill>
-        <p:spPr bwMode="auto">
-          <a:xfrm>
-            <a:off x="7315200" y="6248400"/>
-            <a:ext cx="1828800" cy="609600"/>
-          </a:xfrm>
-          <a:prstGeom prst="rect">
-            <a:avLst/>
-          </a:prstGeom>
-          <a:noFill/>
-          <a:extLst>
-            <a:ext uri="{909E8E84-426E-40DD-AFC4-6F175D3DCCD1}">
-              <a14:hiddenFill xmlns:a14="http://schemas.microsoft.com/office/drawing/2010/main">
-                <a:solidFill>
-                  <a:srgbClr val="FFFFFF"/>
-                </a:solidFill>
-              </a14:hiddenFill>
-            </a:ext>
-          </a:extLst>
-        </p:spPr>
-      </p:pic>
       <p:sp>
         <p:nvSpPr>
           <p:cNvPr id="7" name="Footer Placeholder 4"/>
@@ -3282,7 +2828,7 @@
           <a:p>
             <a:fld id="{4142EED6-FC16-45B9-B8C4-2BC5DBA88325}" type="datetime1">
               <a:rPr lang="en-US" smtClean="0"/>
-              <a:t>5/7/23</a:t>
+              <a:t>5/23/23</a:t>
             </a:fld>
             <a:endParaRPr lang="en-US"/>
           </a:p>
@@ -3316,47 +2862,6 @@
           </a:p>
         </p:txBody>
       </p:sp>
-      <p:pic>
-        <p:nvPicPr>
-          <p:cNvPr id="9" name="Picture 2" descr="Image result for harvard logo transparent"/>
-          <p:cNvPicPr>
-            <a:picLocks noChangeAspect="1" noChangeArrowheads="1"/>
-          </p:cNvPicPr>
-          <p:nvPr userDrawn="1"/>
-        </p:nvPicPr>
-        <p:blipFill>
-          <a:blip r:embed="rId2" cstate="print">
-            <a:extLst>
-              <a:ext uri="{28A0092B-C50C-407E-A947-70E740481C1C}">
-                <a14:useLocalDpi xmlns:a14="http://schemas.microsoft.com/office/drawing/2010/main" val="0"/>
-              </a:ext>
-            </a:extLst>
-          </a:blip>
-          <a:srcRect/>
-          <a:stretch>
-            <a:fillRect/>
-          </a:stretch>
-        </p:blipFill>
-        <p:spPr bwMode="auto">
-          <a:xfrm>
-            <a:off x="7315200" y="6248400"/>
-            <a:ext cx="1828800" cy="609600"/>
-          </a:xfrm>
-          <a:prstGeom prst="rect">
-            <a:avLst/>
-          </a:prstGeom>
-          <a:noFill/>
-          <a:extLst>
-            <a:ext uri="{909E8E84-426E-40DD-AFC4-6F175D3DCCD1}">
-              <a14:hiddenFill xmlns:a14="http://schemas.microsoft.com/office/drawing/2010/main">
-                <a:solidFill>
-                  <a:srgbClr val="FFFFFF"/>
-                </a:solidFill>
-              </a14:hiddenFill>
-            </a:ext>
-          </a:extLst>
-        </p:spPr>
-      </p:pic>
       <p:sp>
         <p:nvSpPr>
           <p:cNvPr id="10" name="Title 1"/>
@@ -3600,7 +3105,7 @@
           <a:p>
             <a:fld id="{DF59512B-4F1D-43D7-8819-2F53FEF69650}" type="datetime1">
               <a:rPr lang="en-US" smtClean="0"/>
-              <a:t>5/7/23</a:t>
+              <a:t>5/23/23</a:t>
             </a:fld>
             <a:endParaRPr lang="en-US"/>
           </a:p>
@@ -3634,47 +3139,6 @@
           </a:p>
         </p:txBody>
       </p:sp>
-      <p:pic>
-        <p:nvPicPr>
-          <p:cNvPr id="9" name="Picture 2" descr="Image result for harvard logo transparent"/>
-          <p:cNvPicPr>
-            <a:picLocks noChangeAspect="1" noChangeArrowheads="1"/>
-          </p:cNvPicPr>
-          <p:nvPr userDrawn="1"/>
-        </p:nvPicPr>
-        <p:blipFill>
-          <a:blip r:embed="rId2" cstate="print">
-            <a:extLst>
-              <a:ext uri="{28A0092B-C50C-407E-A947-70E740481C1C}">
-                <a14:useLocalDpi xmlns:a14="http://schemas.microsoft.com/office/drawing/2010/main" val="0"/>
-              </a:ext>
-            </a:extLst>
-          </a:blip>
-          <a:srcRect/>
-          <a:stretch>
-            <a:fillRect/>
-          </a:stretch>
-        </p:blipFill>
-        <p:spPr bwMode="auto">
-          <a:xfrm>
-            <a:off x="7315200" y="6248400"/>
-            <a:ext cx="1828800" cy="609600"/>
-          </a:xfrm>
-          <a:prstGeom prst="rect">
-            <a:avLst/>
-          </a:prstGeom>
-          <a:noFill/>
-          <a:extLst>
-            <a:ext uri="{909E8E84-426E-40DD-AFC4-6F175D3DCCD1}">
-              <a14:hiddenFill xmlns:a14="http://schemas.microsoft.com/office/drawing/2010/main">
-                <a:solidFill>
-                  <a:srgbClr val="FFFFFF"/>
-                </a:solidFill>
-              </a14:hiddenFill>
-            </a:ext>
-          </a:extLst>
-        </p:spPr>
-      </p:pic>
       <p:sp>
         <p:nvSpPr>
           <p:cNvPr id="10" name="Title 1"/>
@@ -3876,7 +3340,7 @@
           <a:p>
             <a:fld id="{08437B94-E2BF-44DC-ADC5-B05FC9934E9D}" type="datetime1">
               <a:rPr lang="en-US" smtClean="0"/>
-              <a:t>5/7/23</a:t>
+              <a:t>5/23/23</a:t>
             </a:fld>
             <a:endParaRPr lang="en-US"/>
           </a:p>
@@ -4337,7 +3801,7 @@
           <a:p>
             <a:fld id="{6700A58B-DD98-43D0-B791-721480A02982}" type="datetime1">
               <a:rPr lang="en-US" smtClean="0"/>
-              <a:t>5/7/23</a:t>
+              <a:t>5/23/23</a:t>
             </a:fld>
             <a:endParaRPr lang="en-US"/>
           </a:p>
@@ -4767,7 +4231,7 @@
           <a:p>
             <a:fld id="{D753EFC8-4232-4598-94F6-94C0EBAFC469}" type="datetime1">
               <a:rPr lang="en-US" smtClean="0"/>
-              <a:t>5/7/23</a:t>
+              <a:t>5/23/23</a:t>
             </a:fld>
             <a:endParaRPr lang="en-US"/>
           </a:p>
@@ -6495,7 +5959,7 @@
           <a:p>
             <a:fld id="{D753EFC8-4232-4598-94F6-94C0EBAFC469}" type="datetime1">
               <a:rPr lang="en-US" smtClean="0"/>
-              <a:t>5/7/23</a:t>
+              <a:t>5/23/23</a:t>
             </a:fld>
             <a:endParaRPr lang="en-US"/>
           </a:p>
@@ -7183,7 +6647,7 @@
           <a:p>
             <a:fld id="{6700A58B-DD98-43D0-B791-721480A02982}" type="datetime1">
               <a:rPr lang="en-US" smtClean="0"/>
-              <a:t>5/7/23</a:t>
+              <a:t>5/23/23</a:t>
             </a:fld>
             <a:endParaRPr lang="en-US"/>
           </a:p>
@@ -8241,7 +7705,7 @@
           <a:p>
             <a:fld id="{6700A58B-DD98-43D0-B791-721480A02982}" type="datetime1">
               <a:rPr lang="en-US" smtClean="0"/>
-              <a:t>5/7/23</a:t>
+              <a:t>5/23/23</a:t>
             </a:fld>
             <a:endParaRPr lang="en-US"/>
           </a:p>
@@ -10236,7 +9700,7 @@
                 </a:spcAft>
                 <a:defRPr/>
               </a:pPr>
-              <a:t>5/7/23</a:t>
+              <a:t>5/23/23</a:t>
             </a:fld>
             <a:endParaRPr lang="en-US" sz="1000">
               <a:solidFill>
@@ -10505,7 +9969,7 @@
           <a:p>
             <a:fld id="{6700A58B-DD98-43D0-B791-721480A02982}" type="datetime1">
               <a:rPr lang="en-US" smtClean="0"/>
-              <a:t>5/7/23</a:t>
+              <a:t>5/23/23</a:t>
             </a:fld>
             <a:endParaRPr lang="en-US"/>
           </a:p>
@@ -11572,331 +11036,6 @@
     <p:extLst>
       <p:ext uri="{BB962C8B-B14F-4D97-AF65-F5344CB8AC3E}">
         <p14:creationId xmlns:p14="http://schemas.microsoft.com/office/powerpoint/2010/main" val="464616919"/>
-      </p:ext>
-    </p:extLst>
-  </p:cSld>
-  <p:clrMapOvr>
-    <a:masterClrMapping/>
-  </p:clrMapOvr>
-</p:sld>
-</file>
-
-<file path=ppt/slides/slide16.xml><?xml version="1.0" encoding="utf-8"?>
-<p:sld xmlns:a="http://schemas.openxmlformats.org/drawingml/2006/main" xmlns:r="http://schemas.openxmlformats.org/officeDocument/2006/relationships" xmlns:p="http://schemas.openxmlformats.org/presentationml/2006/main">
-  <p:cSld>
-    <p:spTree>
-      <p:nvGrpSpPr>
-        <p:cNvPr id="1" name=""/>
-        <p:cNvGrpSpPr/>
-        <p:nvPr/>
-      </p:nvGrpSpPr>
-      <p:grpSpPr>
-        <a:xfrm>
-          <a:off x="0" y="0"/>
-          <a:ext cx="0" cy="0"/>
-          <a:chOff x="0" y="0"/>
-          <a:chExt cx="0" cy="0"/>
-        </a:xfrm>
-      </p:grpSpPr>
-      <p:sp>
-        <p:nvSpPr>
-          <p:cNvPr id="2" name="Date Placeholder 1"/>
-          <p:cNvSpPr>
-            <a:spLocks noGrp="1"/>
-          </p:cNvSpPr>
-          <p:nvPr>
-            <p:ph type="dt" sz="half" idx="10"/>
-          </p:nvPr>
-        </p:nvSpPr>
-        <p:spPr/>
-        <p:txBody>
-          <a:bodyPr/>
-          <a:lstStyle/>
-          <a:p>
-            <a:fld id="{6700A58B-DD98-43D0-B791-721480A02982}" type="datetime1">
-              <a:rPr lang="en-US" smtClean="0"/>
-              <a:t>5/7/23</a:t>
-            </a:fld>
-            <a:endParaRPr lang="en-US"/>
-          </a:p>
-        </p:txBody>
-      </p:sp>
-      <p:sp>
-        <p:nvSpPr>
-          <p:cNvPr id="3" name="Title 2"/>
-          <p:cNvSpPr>
-            <a:spLocks noGrp="1"/>
-          </p:cNvSpPr>
-          <p:nvPr>
-            <p:ph type="title"/>
-          </p:nvPr>
-        </p:nvSpPr>
-        <p:spPr>
-          <a:xfrm>
-            <a:off x="0" y="365126"/>
-            <a:ext cx="9144000" cy="591477"/>
-          </a:xfrm>
-        </p:spPr>
-        <p:txBody>
-          <a:bodyPr/>
-          <a:lstStyle/>
-          <a:p>
-            <a:r>
-              <a:rPr lang="en-US" sz="3200" dirty="0"/>
-              <a:t>Housekeeping , Reading &amp; Homework, recommended</a:t>
-            </a:r>
-          </a:p>
-        </p:txBody>
-      </p:sp>
-      <p:sp>
-        <p:nvSpPr>
-          <p:cNvPr id="4" name="Slide Number Placeholder 3"/>
-          <p:cNvSpPr>
-            <a:spLocks noGrp="1"/>
-          </p:cNvSpPr>
-          <p:nvPr>
-            <p:ph type="sldNum" sz="quarter" idx="12"/>
-          </p:nvPr>
-        </p:nvSpPr>
-        <p:spPr/>
-        <p:txBody>
-          <a:bodyPr/>
-          <a:lstStyle/>
-          <a:p>
-            <a:fld id="{37290FF7-652B-4475-AEAB-8B1A5D23AE09}" type="slidenum">
-              <a:rPr lang="en-US" smtClean="0"/>
-              <a:t>16</a:t>
-            </a:fld>
-            <a:endParaRPr lang="en-US"/>
-          </a:p>
-        </p:txBody>
-      </p:sp>
-      <p:sp>
-        <p:nvSpPr>
-          <p:cNvPr id="5" name="Footer Placeholder 4"/>
-          <p:cNvSpPr>
-            <a:spLocks noGrp="1"/>
-          </p:cNvSpPr>
-          <p:nvPr>
-            <p:ph type="ftr" sz="quarter" idx="3"/>
-          </p:nvPr>
-        </p:nvSpPr>
-        <p:spPr/>
-        <p:txBody>
-          <a:bodyPr/>
-          <a:lstStyle/>
-          <a:p>
-            <a:r>
-              <a:rPr lang="en-US" dirty="0"/>
-              <a:t>Kwartler</a:t>
-            </a:r>
-          </a:p>
-        </p:txBody>
-      </p:sp>
-      <p:sp>
-        <p:nvSpPr>
-          <p:cNvPr id="6" name="TextBox 5"/>
-          <p:cNvSpPr txBox="1"/>
-          <p:nvPr/>
-        </p:nvSpPr>
-        <p:spPr>
-          <a:xfrm>
-            <a:off x="421856" y="1104653"/>
-            <a:ext cx="8505573" cy="2308324"/>
-          </a:xfrm>
-          <a:prstGeom prst="rect">
-            <a:avLst/>
-          </a:prstGeom>
-          <a:noFill/>
-        </p:spPr>
-        <p:txBody>
-          <a:bodyPr wrap="square" rtlCol="0">
-            <a:spAutoFit/>
-          </a:bodyPr>
-          <a:lstStyle/>
-          <a:p>
-            <a:pPr marL="285750" indent="-285750">
-              <a:buFont typeface="Arial" panose="020B0604020202020204" pitchFamily="34" charset="0"/>
-              <a:buChar char="•"/>
-            </a:pPr>
-            <a:r>
-              <a:rPr lang="en-US" dirty="0"/>
-              <a:t>Make sure you have R Studio Installed</a:t>
-            </a:r>
-          </a:p>
-          <a:p>
-            <a:pPr marL="742950" lvl="1" indent="-285750">
-              <a:buFont typeface="Arial" panose="020B0604020202020204" pitchFamily="34" charset="0"/>
-              <a:buChar char="•"/>
-            </a:pPr>
-            <a:r>
-              <a:rPr lang="en-US" dirty="0"/>
-              <a:t>Sign up at RStudio Cloud</a:t>
-            </a:r>
-          </a:p>
-          <a:p>
-            <a:pPr marL="285750" indent="-285750">
-              <a:buFont typeface="Arial" panose="020B0604020202020204" pitchFamily="34" charset="0"/>
-              <a:buChar char="•"/>
-            </a:pPr>
-            <a:r>
-              <a:rPr lang="en-US" dirty="0"/>
-              <a:t>If local, Recommended to install Git locally for “</a:t>
-            </a:r>
-            <a:r>
-              <a:rPr lang="en-US" i="1" dirty="0"/>
-              <a:t>git pull</a:t>
-            </a:r>
-            <a:r>
-              <a:rPr lang="en-US" dirty="0"/>
-              <a:t>”</a:t>
-            </a:r>
-          </a:p>
-          <a:p>
-            <a:pPr marL="742950" lvl="1" indent="-285750">
-              <a:buFont typeface="Arial" panose="020B0604020202020204" pitchFamily="34" charset="0"/>
-              <a:buChar char="•"/>
-            </a:pPr>
-            <a:r>
-              <a:rPr lang="en-US" dirty="0"/>
-              <a:t>Connect your local to the class repo</a:t>
-            </a:r>
-          </a:p>
-          <a:p>
-            <a:pPr marL="285750" indent="-285750">
-              <a:buFont typeface="Arial" panose="020B0604020202020204" pitchFamily="34" charset="0"/>
-              <a:buChar char="•"/>
-            </a:pPr>
-            <a:endParaRPr lang="en-US" dirty="0"/>
-          </a:p>
-          <a:p>
-            <a:pPr marL="285750" indent="-285750">
-              <a:buFont typeface="Arial" panose="020B0604020202020204" pitchFamily="34" charset="0"/>
-              <a:buChar char="•"/>
-            </a:pPr>
-            <a:r>
-              <a:rPr lang="en-US" dirty="0"/>
-              <a:t>Chapter 1 &amp; Chapter 2</a:t>
-            </a:r>
-          </a:p>
-          <a:p>
-            <a:r>
-              <a:rPr lang="en-US" b="1" dirty="0"/>
-              <a:t>1. Piazza introduction post (slide 7, assigned as part of class participation)…assuming we can get piazza working</a:t>
-            </a:r>
-          </a:p>
-        </p:txBody>
-      </p:sp>
-      <p:cxnSp>
-        <p:nvCxnSpPr>
-          <p:cNvPr id="8" name="Straight Connector 7"/>
-          <p:cNvCxnSpPr/>
-          <p:nvPr/>
-        </p:nvCxnSpPr>
-        <p:spPr>
-          <a:xfrm>
-            <a:off x="530170" y="3362897"/>
-            <a:ext cx="7964905" cy="0"/>
-          </a:xfrm>
-          <a:prstGeom prst="line">
-            <a:avLst/>
-          </a:prstGeom>
-        </p:spPr>
-        <p:style>
-          <a:lnRef idx="1">
-            <a:schemeClr val="accent1"/>
-          </a:lnRef>
-          <a:fillRef idx="0">
-            <a:schemeClr val="accent1"/>
-          </a:fillRef>
-          <a:effectRef idx="0">
-            <a:schemeClr val="accent1"/>
-          </a:effectRef>
-          <a:fontRef idx="minor">
-            <a:schemeClr val="tx1"/>
-          </a:fontRef>
-        </p:style>
-      </p:cxnSp>
-      <p:sp>
-        <p:nvSpPr>
-          <p:cNvPr id="7" name="Rectangle 6">
-            <a:extLst>
-              <a:ext uri="{FF2B5EF4-FFF2-40B4-BE49-F238E27FC236}">
-                <a16:creationId xmlns:a16="http://schemas.microsoft.com/office/drawing/2014/main" id="{EFCCED00-EA09-4545-A705-93608CED5762}"/>
-              </a:ext>
-            </a:extLst>
-          </p:cNvPr>
-          <p:cNvSpPr/>
-          <p:nvPr/>
-        </p:nvSpPr>
-        <p:spPr>
-          <a:xfrm>
-            <a:off x="421856" y="3959198"/>
-            <a:ext cx="4572000" cy="1709699"/>
-          </a:xfrm>
-          <a:prstGeom prst="rect">
-            <a:avLst/>
-          </a:prstGeom>
-        </p:spPr>
-        <p:txBody>
-          <a:bodyPr>
-            <a:spAutoFit/>
-          </a:bodyPr>
-          <a:lstStyle/>
-          <a:p>
-            <a:pPr>
-              <a:lnSpc>
-                <a:spcPct val="115000"/>
-              </a:lnSpc>
-              <a:spcAft>
-                <a:spcPts val="1000"/>
-              </a:spcAft>
-            </a:pPr>
-            <a:r>
-              <a:rPr lang="en-US" dirty="0"/>
-              <a:t>2. C2.1 Data Mining Techniques</a:t>
-            </a:r>
-          </a:p>
-          <a:p>
-            <a:pPr>
-              <a:lnSpc>
-                <a:spcPct val="115000"/>
-              </a:lnSpc>
-              <a:spcAft>
-                <a:spcPts val="1000"/>
-              </a:spcAft>
-            </a:pPr>
-            <a:r>
-              <a:rPr lang="en-US" dirty="0"/>
-              <a:t>3. C2.2 Data Partition</a:t>
-            </a:r>
-          </a:p>
-          <a:p>
-            <a:pPr>
-              <a:lnSpc>
-                <a:spcPct val="115000"/>
-              </a:lnSpc>
-              <a:spcAft>
-                <a:spcPts val="1000"/>
-              </a:spcAft>
-            </a:pPr>
-            <a:r>
-              <a:rPr lang="en-US" dirty="0"/>
-              <a:t>4. C2.3 Data Sample</a:t>
-            </a:r>
-          </a:p>
-          <a:p>
-            <a:r>
-              <a:rPr lang="en-US" dirty="0"/>
-              <a:t>5. C2.4 Modeling Steps </a:t>
-            </a:r>
-          </a:p>
-        </p:txBody>
-      </p:sp>
-    </p:spTree>
-    <p:extLst>
-      <p:ext uri="{BB962C8B-B14F-4D97-AF65-F5344CB8AC3E}">
-        <p14:creationId xmlns:p14="http://schemas.microsoft.com/office/powerpoint/2010/main" val="366491352"/>
       </p:ext>
     </p:extLst>
   </p:cSld>
@@ -11940,7 +11079,7 @@
           <a:p>
             <a:fld id="{6700A58B-DD98-43D0-B791-721480A02982}" type="datetime1">
               <a:rPr lang="en-US" smtClean="0"/>
-              <a:t>5/7/23</a:t>
+              <a:t>5/23/23</a:t>
             </a:fld>
             <a:endParaRPr lang="en-US"/>
           </a:p>
@@ -12550,7 +11689,7 @@
           <a:p>
             <a:fld id="{6700A58B-DD98-43D0-B791-721480A02982}" type="datetime1">
               <a:rPr lang="en-US" smtClean="0"/>
-              <a:t>5/7/23</a:t>
+              <a:t>5/23/23</a:t>
             </a:fld>
             <a:endParaRPr lang="en-US"/>
           </a:p>
@@ -13500,7 +12639,7 @@
           <a:p>
             <a:fld id="{6700A58B-DD98-43D0-B791-721480A02982}" type="datetime1">
               <a:rPr lang="en-US" smtClean="0"/>
-              <a:t>5/7/23</a:t>
+              <a:t>5/23/23</a:t>
             </a:fld>
             <a:endParaRPr lang="en-US"/>
           </a:p>
@@ -14274,7 +13413,7 @@
           <a:p>
             <a:fld id="{6700A58B-DD98-43D0-B791-721480A02982}" type="datetime1">
               <a:rPr lang="en-US" smtClean="0"/>
-              <a:t>5/7/23</a:t>
+              <a:t>5/23/23</a:t>
             </a:fld>
             <a:endParaRPr lang="en-US"/>
           </a:p>
@@ -15631,7 +14770,7 @@
           <a:p>
             <a:fld id="{6700A58B-DD98-43D0-B791-721480A02982}" type="datetime1">
               <a:rPr lang="en-US" smtClean="0"/>
-              <a:t>5/7/23</a:t>
+              <a:t>5/23/23</a:t>
             </a:fld>
             <a:endParaRPr lang="en-US"/>
           </a:p>
@@ -16005,7 +15144,7 @@
           <a:p>
             <a:fld id="{D753EFC8-4232-4598-94F6-94C0EBAFC469}" type="datetime1">
               <a:rPr lang="en-US" smtClean="0"/>
-              <a:t>5/7/23</a:t>
+              <a:t>5/23/23</a:t>
             </a:fld>
             <a:endParaRPr lang="en-US" dirty="0"/>
           </a:p>
@@ -18105,7 +17244,7 @@
           <a:p>
             <a:fld id="{D753EFC8-4232-4598-94F6-94C0EBAFC469}" type="datetime1">
               <a:rPr lang="en-US" smtClean="0"/>
-              <a:t>5/7/23</a:t>
+              <a:t>5/23/23</a:t>
             </a:fld>
             <a:endParaRPr lang="en-US"/>
           </a:p>
@@ -19661,7 +18800,7 @@
           <a:p>
             <a:fld id="{D753EFC8-4232-4598-94F6-94C0EBAFC469}" type="datetime1">
               <a:rPr lang="en-US" smtClean="0"/>
-              <a:t>5/7/23</a:t>
+              <a:t>5/23/23</a:t>
             </a:fld>
             <a:endParaRPr lang="en-US"/>
           </a:p>

</xml_diff>